<commit_message>
Fix scenario 3 & 6, updated full cohort analysis
</commit_message>
<xml_diff>
--- a/documentation/Thesis Interim Results.pptx
+++ b/documentation/Thesis Interim Results.pptx
@@ -5,27 +5,28 @@
     <p:sldMasterId id="2147483648" r:id="rId1"/>
   </p:sldMasterIdLst>
   <p:notesMasterIdLst>
-    <p:notesMasterId r:id="rId20"/>
+    <p:notesMasterId r:id="rId21"/>
   </p:notesMasterIdLst>
   <p:sldIdLst>
     <p:sldId id="271" r:id="rId2"/>
     <p:sldId id="270" r:id="rId3"/>
     <p:sldId id="272" r:id="rId4"/>
     <p:sldId id="273" r:id="rId5"/>
-    <p:sldId id="256" r:id="rId6"/>
-    <p:sldId id="257" r:id="rId7"/>
-    <p:sldId id="258" r:id="rId8"/>
-    <p:sldId id="259" r:id="rId9"/>
-    <p:sldId id="260" r:id="rId10"/>
-    <p:sldId id="261" r:id="rId11"/>
-    <p:sldId id="262" r:id="rId12"/>
-    <p:sldId id="263" r:id="rId13"/>
-    <p:sldId id="265" r:id="rId14"/>
-    <p:sldId id="264" r:id="rId15"/>
-    <p:sldId id="266" r:id="rId16"/>
-    <p:sldId id="267" r:id="rId17"/>
-    <p:sldId id="268" r:id="rId18"/>
-    <p:sldId id="269" r:id="rId19"/>
+    <p:sldId id="274" r:id="rId6"/>
+    <p:sldId id="256" r:id="rId7"/>
+    <p:sldId id="257" r:id="rId8"/>
+    <p:sldId id="258" r:id="rId9"/>
+    <p:sldId id="259" r:id="rId10"/>
+    <p:sldId id="260" r:id="rId11"/>
+    <p:sldId id="261" r:id="rId12"/>
+    <p:sldId id="262" r:id="rId13"/>
+    <p:sldId id="263" r:id="rId14"/>
+    <p:sldId id="265" r:id="rId15"/>
+    <p:sldId id="264" r:id="rId16"/>
+    <p:sldId id="266" r:id="rId17"/>
+    <p:sldId id="267" r:id="rId18"/>
+    <p:sldId id="268" r:id="rId19"/>
+    <p:sldId id="269" r:id="rId20"/>
   </p:sldIdLst>
   <p:sldSz cx="12192000" cy="6858000"/>
   <p:notesSz cx="6858000" cy="9144000"/>
@@ -135,7 +136,7 @@
 <file path=ppt/revisionInfo.xml><?xml version="1.0" encoding="utf-8"?>
 <p1510:revInfo xmlns:a="http://schemas.openxmlformats.org/drawingml/2006/main" xmlns:r="http://schemas.openxmlformats.org/officeDocument/2006/relationships" xmlns:p1510="http://schemas.microsoft.com/office/powerpoint/2015/10/main">
   <p1510:revLst>
-    <p1510:client id="{94512132-5EE2-A046-A19D-E09A0566D924}" v="6" dt="2024-05-07T08:28:55.871"/>
+    <p1510:client id="{94512132-5EE2-A046-A19D-E09A0566D924}" v="18" dt="2024-05-07T12:47:56.867"/>
   </p1510:revLst>
 </p1510:revInfo>
 </file>
@@ -554,7 +555,7 @@
           <a:p>
             <a:fld id="{485BF608-1CF3-7940-8667-CE6C14C5B088}" type="slidenum">
               <a:rPr lang="en-GB" smtClean="0"/>
-              <a:t>15</a:t>
+              <a:t>16</a:t>
             </a:fld>
             <a:endParaRPr lang="en-GB"/>
           </a:p>
@@ -638,7 +639,7 @@
           <a:p>
             <a:fld id="{485BF608-1CF3-7940-8667-CE6C14C5B088}" type="slidenum">
               <a:rPr lang="en-GB" smtClean="0"/>
-              <a:t>16</a:t>
+              <a:t>17</a:t>
             </a:fld>
             <a:endParaRPr lang="en-GB"/>
           </a:p>
@@ -722,7 +723,7 @@
           <a:p>
             <a:fld id="{485BF608-1CF3-7940-8667-CE6C14C5B088}" type="slidenum">
               <a:rPr lang="en-GB" smtClean="0"/>
-              <a:t>17</a:t>
+              <a:t>18</a:t>
             </a:fld>
             <a:endParaRPr lang="en-GB"/>
           </a:p>
@@ -4057,6 +4058,99 @@
         <p:spPr>
           <a:xfrm>
             <a:off x="167519" y="204574"/>
+            <a:ext cx="7892748" cy="1325563"/>
+          </a:xfrm>
+        </p:spPr>
+        <p:txBody>
+          <a:bodyPr/>
+          <a:lstStyle/>
+          <a:p>
+            <a:r>
+              <a:rPr lang="en-GB" dirty="0"/>
+              <a:t>Tornado Plots: Progression</a:t>
+            </a:r>
+          </a:p>
+        </p:txBody>
+      </p:sp>
+      <p:pic>
+        <p:nvPicPr>
+          <p:cNvPr id="5" name="Picture 4">
+            <a:extLst>
+              <a:ext uri="{FF2B5EF4-FFF2-40B4-BE49-F238E27FC236}">
+                <a16:creationId xmlns:a16="http://schemas.microsoft.com/office/drawing/2014/main" id="{3C7AAEEF-68D0-F824-D25D-86B26417EFD8}"/>
+              </a:ext>
+            </a:extLst>
+          </p:cNvPr>
+          <p:cNvPicPr>
+            <a:picLocks noChangeAspect="1"/>
+          </p:cNvPicPr>
+          <p:nvPr/>
+        </p:nvPicPr>
+        <p:blipFill>
+          <a:blip r:embed="rId2"/>
+          <a:stretch>
+            <a:fillRect/>
+          </a:stretch>
+        </p:blipFill>
+        <p:spPr>
+          <a:xfrm>
+            <a:off x="287867" y="1246231"/>
+            <a:ext cx="9096796" cy="5109413"/>
+          </a:xfrm>
+          <a:prstGeom prst="rect">
+            <a:avLst/>
+          </a:prstGeom>
+        </p:spPr>
+      </p:pic>
+    </p:spTree>
+    <p:extLst>
+      <p:ext uri="{BB962C8B-B14F-4D97-AF65-F5344CB8AC3E}">
+        <p14:creationId xmlns:p14="http://schemas.microsoft.com/office/powerpoint/2010/main" val="455533378"/>
+      </p:ext>
+    </p:extLst>
+  </p:cSld>
+  <p:clrMapOvr>
+    <a:masterClrMapping/>
+  </p:clrMapOvr>
+</p:sld>
+</file>
+
+<file path=ppt/slides/slide11.xml><?xml version="1.0" encoding="utf-8"?>
+<p:sld xmlns:a="http://schemas.openxmlformats.org/drawingml/2006/main" xmlns:r="http://schemas.openxmlformats.org/officeDocument/2006/relationships" xmlns:p="http://schemas.openxmlformats.org/presentationml/2006/main">
+  <p:cSld>
+    <p:spTree>
+      <p:nvGrpSpPr>
+        <p:cNvPr id="1" name=""/>
+        <p:cNvGrpSpPr/>
+        <p:nvPr/>
+      </p:nvGrpSpPr>
+      <p:grpSpPr>
+        <a:xfrm>
+          <a:off x="0" y="0"/>
+          <a:ext cx="0" cy="0"/>
+          <a:chOff x="0" y="0"/>
+          <a:chExt cx="0" cy="0"/>
+        </a:xfrm>
+      </p:grpSpPr>
+      <p:sp>
+        <p:nvSpPr>
+          <p:cNvPr id="2" name="Title 1">
+            <a:extLst>
+              <a:ext uri="{FF2B5EF4-FFF2-40B4-BE49-F238E27FC236}">
+                <a16:creationId xmlns:a16="http://schemas.microsoft.com/office/drawing/2014/main" id="{0D3F3A6F-B77F-5F36-593F-AC0FCC1F4217}"/>
+              </a:ext>
+            </a:extLst>
+          </p:cNvPr>
+          <p:cNvSpPr>
+            <a:spLocks noGrp="1"/>
+          </p:cNvSpPr>
+          <p:nvPr>
+            <p:ph type="title"/>
+          </p:nvPr>
+        </p:nvSpPr>
+        <p:spPr>
+          <a:xfrm>
+            <a:off x="167519" y="204574"/>
             <a:ext cx="9958614" cy="1325563"/>
           </a:xfrm>
         </p:spPr>
@@ -4114,7 +4208,7 @@
 </p:sld>
 </file>
 
-<file path=ppt/slides/slide11.xml><?xml version="1.0" encoding="utf-8"?>
+<file path=ppt/slides/slide12.xml><?xml version="1.0" encoding="utf-8"?>
 <p:sld xmlns:a="http://schemas.openxmlformats.org/drawingml/2006/main" xmlns:r="http://schemas.openxmlformats.org/officeDocument/2006/relationships" xmlns:p="http://schemas.openxmlformats.org/presentationml/2006/main">
   <p:cSld>
     <p:spTree>
@@ -4207,7 +4301,7 @@
 </p:sld>
 </file>
 
-<file path=ppt/slides/slide12.xml><?xml version="1.0" encoding="utf-8"?>
+<file path=ppt/slides/slide13.xml><?xml version="1.0" encoding="utf-8"?>
 <p:sld xmlns:a="http://schemas.openxmlformats.org/drawingml/2006/main" xmlns:r="http://schemas.openxmlformats.org/officeDocument/2006/relationships" xmlns:p="http://schemas.openxmlformats.org/presentationml/2006/main">
   <p:cSld>
     <p:spTree>
@@ -4412,7 +4506,7 @@
 </p:sld>
 </file>
 
-<file path=ppt/slides/slide13.xml><?xml version="1.0" encoding="utf-8"?>
+<file path=ppt/slides/slide14.xml><?xml version="1.0" encoding="utf-8"?>
 <p:sld xmlns:a="http://schemas.openxmlformats.org/drawingml/2006/main" xmlns:r="http://schemas.openxmlformats.org/officeDocument/2006/relationships" xmlns:p="http://schemas.openxmlformats.org/presentationml/2006/main">
   <p:cSld>
     <p:spTree>
@@ -4600,7 +4694,7 @@
 </p:sld>
 </file>
 
-<file path=ppt/slides/slide14.xml><?xml version="1.0" encoding="utf-8"?>
+<file path=ppt/slides/slide15.xml><?xml version="1.0" encoding="utf-8"?>
 <p:sld xmlns:a="http://schemas.openxmlformats.org/drawingml/2006/main" xmlns:r="http://schemas.openxmlformats.org/officeDocument/2006/relationships" xmlns:p="http://schemas.openxmlformats.org/presentationml/2006/main">
   <p:cSld>
     <p:spTree>
@@ -4786,7 +4880,7 @@
 </p:sld>
 </file>
 
-<file path=ppt/slides/slide15.xml><?xml version="1.0" encoding="utf-8"?>
+<file path=ppt/slides/slide16.xml><?xml version="1.0" encoding="utf-8"?>
 <p:sld xmlns:a="http://schemas.openxmlformats.org/drawingml/2006/main" xmlns:r="http://schemas.openxmlformats.org/officeDocument/2006/relationships" xmlns:p="http://schemas.openxmlformats.org/presentationml/2006/main">
   <p:cSld>
     <p:spTree>
@@ -5181,7 +5275,7 @@
 </p:sld>
 </file>
 
-<file path=ppt/slides/slide16.xml><?xml version="1.0" encoding="utf-8"?>
+<file path=ppt/slides/slide17.xml><?xml version="1.0" encoding="utf-8"?>
 <p:sld xmlns:a="http://schemas.openxmlformats.org/drawingml/2006/main" xmlns:r="http://schemas.openxmlformats.org/officeDocument/2006/relationships" xmlns:p="http://schemas.openxmlformats.org/presentationml/2006/main">
   <p:cSld>
     <p:spTree>
@@ -6299,7 +6393,7 @@
 </p:sld>
 </file>
 
-<file path=ppt/slides/slide17.xml><?xml version="1.0" encoding="utf-8"?>
+<file path=ppt/slides/slide18.xml><?xml version="1.0" encoding="utf-8"?>
 <p:sld xmlns:a="http://schemas.openxmlformats.org/drawingml/2006/main" xmlns:r="http://schemas.openxmlformats.org/officeDocument/2006/relationships" xmlns:p="http://schemas.openxmlformats.org/presentationml/2006/main">
   <p:cSld>
     <p:spTree>
@@ -6518,7 +6612,7 @@
 </p:sld>
 </file>
 
-<file path=ppt/slides/slide18.xml><?xml version="1.0" encoding="utf-8"?>
+<file path=ppt/slides/slide19.xml><?xml version="1.0" encoding="utf-8"?>
 <p:sld xmlns:a="http://schemas.openxmlformats.org/drawingml/2006/main" xmlns:r="http://schemas.openxmlformats.org/officeDocument/2006/relationships" xmlns:p="http://schemas.openxmlformats.org/presentationml/2006/main">
   <p:cSld>
     <p:spTree>
@@ -6611,7 +6705,7 @@
           <p:nvPr>
             <p:extLst>
               <p:ext uri="{D42A27DB-BD31-4B8C-83A1-F6EECF244321}">
-                <p14:modId xmlns:p14="http://schemas.microsoft.com/office/powerpoint/2010/main" val="4008902735"/>
+                <p14:modId xmlns:p14="http://schemas.microsoft.com/office/powerpoint/2010/main" val="4221914744"/>
               </p:ext>
             </p:extLst>
           </p:nvPr>
@@ -7231,7 +7325,7 @@
                     <a:p>
                       <a:r>
                         <a:rPr lang="en-GB" sz="1600" dirty="0"/>
-                        <a:t>66.0</a:t>
+                        <a:t>71.8</a:t>
                       </a:r>
                     </a:p>
                   </a:txBody>
@@ -7244,7 +7338,7 @@
                     <a:p>
                       <a:r>
                         <a:rPr lang="en-GB" sz="1600" dirty="0"/>
-                        <a:t>8.9</a:t>
+                        <a:t>14.7</a:t>
                       </a:r>
                     </a:p>
                   </a:txBody>
@@ -7257,7 +7351,7 @@
                     <a:p>
                       <a:r>
                         <a:rPr lang="en-GB" sz="1600" dirty="0"/>
-                        <a:t>453 383</a:t>
+                        <a:t>448 253</a:t>
                       </a:r>
                     </a:p>
                   </a:txBody>
@@ -7270,7 +7364,7 @@
                     <a:p>
                       <a:r>
                         <a:rPr lang="en-GB" sz="1600" dirty="0"/>
-                        <a:t>10 129</a:t>
+                        <a:t>15 259</a:t>
                       </a:r>
                     </a:p>
                   </a:txBody>
@@ -7283,7 +7377,7 @@
                     <a:p>
                       <a:r>
                         <a:rPr lang="en-GB" sz="1600" dirty="0"/>
-                        <a:t>1 599 (-27%)</a:t>
+                        <a:t>1 330 (-39.3%)</a:t>
                       </a:r>
                     </a:p>
                   </a:txBody>
@@ -7313,7 +7407,7 @@
                       </a:pPr>
                       <a:r>
                         <a:rPr lang="en-GB" sz="1600" dirty="0"/>
-                        <a:t>5 481 830</a:t>
+                        <a:t>5 427 800</a:t>
                       </a:r>
                     </a:p>
                   </a:txBody>
@@ -7326,7 +7420,7 @@
                     <a:p>
                       <a:r>
                         <a:rPr lang="en-GB" sz="1600" dirty="0"/>
-                        <a:t>102 040</a:t>
+                        <a:t>156 070</a:t>
                       </a:r>
                     </a:p>
                   </a:txBody>
@@ -7339,7 +7433,7 @@
                     <a:p>
                       <a:r>
                         <a:rPr lang="en-GB" sz="1600" dirty="0"/>
-                        <a:t>33 122 (-24.7%)</a:t>
+                        <a:t>27 753 (-36.9%)</a:t>
                       </a:r>
                     </a:p>
                   </a:txBody>
@@ -7620,7 +7714,7 @@
                     <a:p>
                       <a:r>
                         <a:rPr lang="en-GB" sz="1600" dirty="0"/>
-                        <a:t>76.9</a:t>
+                        <a:t>83.5</a:t>
                       </a:r>
                     </a:p>
                   </a:txBody>
@@ -7633,7 +7727,7 @@
                     <a:p>
                       <a:r>
                         <a:rPr lang="en-GB" sz="1600" dirty="0"/>
-                        <a:t>19.8</a:t>
+                        <a:t>26.4</a:t>
                       </a:r>
                     </a:p>
                   </a:txBody>
@@ -7646,7 +7740,7 @@
                     <a:p>
                       <a:r>
                         <a:rPr lang="en-GB" sz="1600" dirty="0"/>
-                        <a:t>444 414</a:t>
+                        <a:t>440 231</a:t>
                       </a:r>
                     </a:p>
                   </a:txBody>
@@ -7659,7 +7753,7 @@
                     <a:p>
                       <a:r>
                         <a:rPr lang="en-GB" sz="1600" dirty="0"/>
-                        <a:t>19098</a:t>
+                        <a:t>23 281</a:t>
                       </a:r>
                     </a:p>
                   </a:txBody>
@@ -7672,7 +7766,7 @@
                     <a:p>
                       <a:r>
                         <a:rPr lang="en-GB" sz="1600" dirty="0"/>
-                        <a:t>1 144 (-47.8%)</a:t>
+                        <a:t>956 (-56.3%)</a:t>
                       </a:r>
                     </a:p>
                   </a:txBody>
@@ -7685,7 +7779,7 @@
                     <a:p>
                       <a:r>
                         <a:rPr lang="en-GB" sz="1600" dirty="0"/>
-                        <a:t>5 386 190</a:t>
+                        <a:t>5 339 620</a:t>
                       </a:r>
                     </a:p>
                   </a:txBody>
@@ -7698,7 +7792,7 @@
                     <a:p>
                       <a:r>
                         <a:rPr lang="en-GB" sz="1600" dirty="0"/>
-                        <a:t>197680</a:t>
+                        <a:t>244 250</a:t>
                       </a:r>
                     </a:p>
                   </a:txBody>
@@ -7711,7 +7805,7 @@
                     <a:p>
                       <a:r>
                         <a:rPr lang="en-GB" sz="1600" dirty="0"/>
-                        <a:t>23 802 (-45.9%)</a:t>
+                        <a:t>19 572 (-55.5%)</a:t>
                       </a:r>
                     </a:p>
                   </a:txBody>
@@ -8142,34 +8236,701 @@
           <a:lstStyle/>
           <a:p>
             <a:r>
-              <a:rPr lang="en-GB"/>
-              <a:t>Scenario Results</a:t>
-            </a:r>
-          </a:p>
-        </p:txBody>
-      </p:sp>
-      <p:sp>
-        <p:nvSpPr>
-          <p:cNvPr id="3" name="Content Placeholder 2">
-            <a:extLst>
-              <a:ext uri="{FF2B5EF4-FFF2-40B4-BE49-F238E27FC236}">
-                <a16:creationId xmlns:a16="http://schemas.microsoft.com/office/drawing/2014/main" id="{B9465163-660E-D60E-9A5C-2204E9E07C19}"/>
-              </a:ext>
-            </a:extLst>
-          </p:cNvPr>
-          <p:cNvSpPr>
-            <a:spLocks noGrp="1"/>
-          </p:cNvSpPr>
-          <p:nvPr>
-            <p:ph idx="1"/>
-          </p:nvPr>
-        </p:nvSpPr>
-        <p:spPr/>
-        <p:txBody>
-          <a:bodyPr/>
+              <a:rPr lang="en-GB" dirty="0"/>
+              <a:t>Scenario Results: Case detection</a:t>
+            </a:r>
+          </a:p>
+        </p:txBody>
+      </p:sp>
+      <p:graphicFrame>
+        <p:nvGraphicFramePr>
+          <p:cNvPr id="7" name="Table 6">
+            <a:extLst>
+              <a:ext uri="{FF2B5EF4-FFF2-40B4-BE49-F238E27FC236}">
+                <a16:creationId xmlns:a16="http://schemas.microsoft.com/office/drawing/2014/main" id="{8B9ADBAB-B244-AC59-3A16-E88E3828AD08}"/>
+              </a:ext>
+            </a:extLst>
+          </p:cNvPr>
+          <p:cNvGraphicFramePr>
+            <a:graphicFrameLocks noGrp="1"/>
+          </p:cNvGraphicFramePr>
+          <p:nvPr>
+            <p:extLst>
+              <p:ext uri="{D42A27DB-BD31-4B8C-83A1-F6EECF244321}">
+                <p14:modId xmlns:p14="http://schemas.microsoft.com/office/powerpoint/2010/main" val="3450152585"/>
+              </p:ext>
+            </p:extLst>
+          </p:nvPr>
+        </p:nvGraphicFramePr>
+        <p:xfrm>
+          <a:off x="8843191" y="2782389"/>
+          <a:ext cx="3022601" cy="1805351"/>
+        </p:xfrm>
+        <a:graphic>
+          <a:graphicData uri="http://schemas.openxmlformats.org/drawingml/2006/table">
+            <a:tbl>
+              <a:tblPr>
+                <a:tableStyleId>{5940675A-B579-460E-94D1-54222C63F5DA}</a:tableStyleId>
+              </a:tblPr>
+              <a:tblGrid>
+                <a:gridCol w="826938">
+                  <a:extLst>
+                    <a:ext uri="{9D8B030D-6E8A-4147-A177-3AD203B41FA5}">
+                      <a16:colId xmlns:a16="http://schemas.microsoft.com/office/drawing/2014/main" val="68298796"/>
+                    </a:ext>
+                  </a:extLst>
+                </a:gridCol>
+                <a:gridCol w="1102584">
+                  <a:extLst>
+                    <a:ext uri="{9D8B030D-6E8A-4147-A177-3AD203B41FA5}">
+                      <a16:colId xmlns:a16="http://schemas.microsoft.com/office/drawing/2014/main" val="1062523197"/>
+                    </a:ext>
+                  </a:extLst>
+                </a:gridCol>
+                <a:gridCol w="1093079">
+                  <a:extLst>
+                    <a:ext uri="{9D8B030D-6E8A-4147-A177-3AD203B41FA5}">
+                      <a16:colId xmlns:a16="http://schemas.microsoft.com/office/drawing/2014/main" val="2914458079"/>
+                    </a:ext>
+                  </a:extLst>
+                </a:gridCol>
+              </a:tblGrid>
+              <a:tr h="458516">
+                <a:tc>
+                  <a:txBody>
+                    <a:bodyPr/>
+                    <a:lstStyle/>
+                    <a:p>
+                      <a:pPr algn="ctr" fontAlgn="b"/>
+                      <a:r>
+                        <a:rPr lang="en-ZA" sz="1200" b="1" u="none" strike="noStrike" dirty="0">
+                          <a:effectLst/>
+                        </a:rPr>
+                        <a:t>Scenario</a:t>
+                      </a:r>
+                      <a:endParaRPr lang="en-ZA" sz="1200" b="1" i="0" u="none" strike="noStrike" dirty="0">
+                        <a:solidFill>
+                          <a:srgbClr val="000000"/>
+                        </a:solidFill>
+                        <a:effectLst/>
+                        <a:latin typeface="Aptos Narrow" panose="020B0004020202020204" pitchFamily="34" charset="0"/>
+                      </a:endParaRPr>
+                    </a:p>
+                  </a:txBody>
+                  <a:tcPr marL="9525" marR="9525" marT="9525" marB="0"/>
+                </a:tc>
+                <a:tc>
+                  <a:txBody>
+                    <a:bodyPr/>
+                    <a:lstStyle/>
+                    <a:p>
+                      <a:pPr algn="ctr" fontAlgn="b"/>
+                      <a:r>
+                        <a:rPr lang="en-ZA" sz="1200" b="1" u="none" strike="noStrike" dirty="0">
+                          <a:effectLst/>
+                        </a:rPr>
+                        <a:t>Case detection Rate</a:t>
+                      </a:r>
+                      <a:endParaRPr lang="en-ZA" sz="1200" b="1" i="0" u="none" strike="noStrike" dirty="0">
+                        <a:solidFill>
+                          <a:srgbClr val="000000"/>
+                        </a:solidFill>
+                        <a:effectLst/>
+                        <a:latin typeface="Aptos Narrow" panose="020B0004020202020204" pitchFamily="34" charset="0"/>
+                      </a:endParaRPr>
+                    </a:p>
+                  </a:txBody>
+                  <a:tcPr marL="9525" marR="9525" marT="9525" marB="0"/>
+                </a:tc>
+                <a:tc>
+                  <a:txBody>
+                    <a:bodyPr/>
+                    <a:lstStyle/>
+                    <a:p>
+                      <a:pPr algn="ctr" fontAlgn="b"/>
+                      <a:r>
+                        <a:rPr lang="en-ZA" sz="1200" b="1" u="none" strike="noStrike" dirty="0">
+                          <a:effectLst/>
+                        </a:rPr>
+                        <a:t>Change in CDR from baseline</a:t>
+                      </a:r>
+                      <a:endParaRPr lang="en-ZA" sz="1200" b="1" i="0" u="none" strike="noStrike" dirty="0">
+                        <a:solidFill>
+                          <a:srgbClr val="000000"/>
+                        </a:solidFill>
+                        <a:effectLst/>
+                        <a:latin typeface="Aptos Narrow" panose="020B0004020202020204" pitchFamily="34" charset="0"/>
+                      </a:endParaRPr>
+                    </a:p>
+                  </a:txBody>
+                  <a:tcPr marL="9525" marR="9525" marT="9525" marB="0"/>
+                </a:tc>
+                <a:extLst>
+                  <a:ext uri="{0D108BD9-81ED-4DB2-BD59-A6C34878D82A}">
+                    <a16:rowId xmlns:a16="http://schemas.microsoft.com/office/drawing/2014/main" val="3516095565"/>
+                  </a:ext>
+                </a:extLst>
+              </a:tr>
+              <a:tr h="188109">
+                <a:tc>
+                  <a:txBody>
+                    <a:bodyPr/>
+                    <a:lstStyle/>
+                    <a:p>
+                      <a:pPr algn="ctr" fontAlgn="b"/>
+                      <a:r>
+                        <a:rPr lang="en-ZA" sz="1200" u="none" strike="noStrike">
+                          <a:effectLst/>
+                        </a:rPr>
+                        <a:t>Baseline</a:t>
+                      </a:r>
+                      <a:endParaRPr lang="en-ZA" sz="1200" b="0" i="0" u="none" strike="noStrike">
+                        <a:solidFill>
+                          <a:srgbClr val="000000"/>
+                        </a:solidFill>
+                        <a:effectLst/>
+                        <a:latin typeface="Aptos Narrow" panose="020B0004020202020204" pitchFamily="34" charset="0"/>
+                      </a:endParaRPr>
+                    </a:p>
+                  </a:txBody>
+                  <a:tcPr marL="9525" marR="9525" marT="9525" marB="0"/>
+                </a:tc>
+                <a:tc>
+                  <a:txBody>
+                    <a:bodyPr/>
+                    <a:lstStyle/>
+                    <a:p>
+                      <a:pPr algn="ctr" fontAlgn="b"/>
+                      <a:r>
+                        <a:rPr lang="en-ZA" sz="1200" b="0" i="0" u="none" strike="noStrike">
+                          <a:solidFill>
+                            <a:srgbClr val="000000"/>
+                          </a:solidFill>
+                          <a:effectLst/>
+                          <a:latin typeface="Aptos Narrow" panose="020B0004020202020204" pitchFamily="34" charset="0"/>
+                        </a:rPr>
+                        <a:t>57.09%</a:t>
+                      </a:r>
+                    </a:p>
+                  </a:txBody>
+                  <a:tcPr marL="9525" marR="9525" marT="9525" marB="0" anchor="ctr"/>
+                </a:tc>
+                <a:tc>
+                  <a:txBody>
+                    <a:bodyPr/>
+                    <a:lstStyle/>
+                    <a:p>
+                      <a:pPr algn="ctr" fontAlgn="b"/>
+                      <a:r>
+                        <a:rPr lang="en-ZA" sz="1200" b="0" i="0" u="none" strike="noStrike">
+                          <a:solidFill>
+                            <a:srgbClr val="000000"/>
+                          </a:solidFill>
+                          <a:effectLst/>
+                          <a:latin typeface="Aptos Narrow" panose="020B0004020202020204" pitchFamily="34" charset="0"/>
+                        </a:rPr>
+                        <a:t>-</a:t>
+                      </a:r>
+                    </a:p>
+                  </a:txBody>
+                  <a:tcPr marL="9525" marR="9525" marT="9525" marB="0" anchor="ctr"/>
+                </a:tc>
+                <a:extLst>
+                  <a:ext uri="{0D108BD9-81ED-4DB2-BD59-A6C34878D82A}">
+                    <a16:rowId xmlns:a16="http://schemas.microsoft.com/office/drawing/2014/main" val="2402405288"/>
+                  </a:ext>
+                </a:extLst>
+              </a:tr>
+              <a:tr h="188109">
+                <a:tc>
+                  <a:txBody>
+                    <a:bodyPr/>
+                    <a:lstStyle/>
+                    <a:p>
+                      <a:pPr algn="ctr" fontAlgn="b"/>
+                      <a:r>
+                        <a:rPr lang="en-ZA" sz="1200" u="none" strike="noStrike">
+                          <a:effectLst/>
+                        </a:rPr>
+                        <a:t>1</a:t>
+                      </a:r>
+                      <a:endParaRPr lang="en-ZA" sz="1200" b="0" i="0" u="none" strike="noStrike">
+                        <a:solidFill>
+                          <a:srgbClr val="000000"/>
+                        </a:solidFill>
+                        <a:effectLst/>
+                        <a:latin typeface="Aptos Narrow" panose="020B0004020202020204" pitchFamily="34" charset="0"/>
+                      </a:endParaRPr>
+                    </a:p>
+                  </a:txBody>
+                  <a:tcPr marL="9525" marR="9525" marT="9525" marB="0"/>
+                </a:tc>
+                <a:tc>
+                  <a:txBody>
+                    <a:bodyPr/>
+                    <a:lstStyle/>
+                    <a:p>
+                      <a:pPr algn="ctr" fontAlgn="b"/>
+                      <a:r>
+                        <a:rPr lang="en-ZA" sz="1200" b="0" i="0" u="none" strike="noStrike">
+                          <a:solidFill>
+                            <a:srgbClr val="000000"/>
+                          </a:solidFill>
+                          <a:effectLst/>
+                          <a:latin typeface="Aptos Narrow" panose="020B0004020202020204" pitchFamily="34" charset="0"/>
+                        </a:rPr>
+                        <a:t>63.36%</a:t>
+                      </a:r>
+                    </a:p>
+                  </a:txBody>
+                  <a:tcPr marL="9525" marR="9525" marT="9525" marB="0" anchor="ctr"/>
+                </a:tc>
+                <a:tc>
+                  <a:txBody>
+                    <a:bodyPr/>
+                    <a:lstStyle/>
+                    <a:p>
+                      <a:pPr algn="ctr" fontAlgn="b"/>
+                      <a:r>
+                        <a:rPr lang="en-ZA" sz="1200" b="0" i="0" u="none" strike="noStrike">
+                          <a:solidFill>
+                            <a:srgbClr val="000000"/>
+                          </a:solidFill>
+                          <a:effectLst/>
+                          <a:latin typeface="Aptos Narrow" panose="020B0004020202020204" pitchFamily="34" charset="0"/>
+                        </a:rPr>
+                        <a:t>6.27%</a:t>
+                      </a:r>
+                    </a:p>
+                  </a:txBody>
+                  <a:tcPr marL="9525" marR="9525" marT="9525" marB="0" anchor="ctr"/>
+                </a:tc>
+                <a:extLst>
+                  <a:ext uri="{0D108BD9-81ED-4DB2-BD59-A6C34878D82A}">
+                    <a16:rowId xmlns:a16="http://schemas.microsoft.com/office/drawing/2014/main" val="1891205095"/>
+                  </a:ext>
+                </a:extLst>
+              </a:tr>
+              <a:tr h="188109">
+                <a:tc>
+                  <a:txBody>
+                    <a:bodyPr/>
+                    <a:lstStyle/>
+                    <a:p>
+                      <a:pPr algn="ctr" fontAlgn="b"/>
+                      <a:r>
+                        <a:rPr lang="en-ZA" sz="1200" u="none" strike="noStrike">
+                          <a:effectLst/>
+                        </a:rPr>
+                        <a:t>2</a:t>
+                      </a:r>
+                      <a:endParaRPr lang="en-ZA" sz="1200" b="0" i="0" u="none" strike="noStrike">
+                        <a:solidFill>
+                          <a:srgbClr val="000000"/>
+                        </a:solidFill>
+                        <a:effectLst/>
+                        <a:latin typeface="Aptos Narrow" panose="020B0004020202020204" pitchFamily="34" charset="0"/>
+                      </a:endParaRPr>
+                    </a:p>
+                  </a:txBody>
+                  <a:tcPr marL="9525" marR="9525" marT="9525" marB="0"/>
+                </a:tc>
+                <a:tc>
+                  <a:txBody>
+                    <a:bodyPr/>
+                    <a:lstStyle/>
+                    <a:p>
+                      <a:pPr algn="ctr" fontAlgn="b"/>
+                      <a:r>
+                        <a:rPr lang="en-ZA" sz="1200" b="0" i="0" u="none" strike="noStrike">
+                          <a:solidFill>
+                            <a:srgbClr val="000000"/>
+                          </a:solidFill>
+                          <a:effectLst/>
+                          <a:latin typeface="Aptos Narrow" panose="020B0004020202020204" pitchFamily="34" charset="0"/>
+                        </a:rPr>
+                        <a:t>64.35%</a:t>
+                      </a:r>
+                    </a:p>
+                  </a:txBody>
+                  <a:tcPr marL="9525" marR="9525" marT="9525" marB="0" anchor="ctr"/>
+                </a:tc>
+                <a:tc>
+                  <a:txBody>
+                    <a:bodyPr/>
+                    <a:lstStyle/>
+                    <a:p>
+                      <a:pPr algn="ctr" fontAlgn="b"/>
+                      <a:r>
+                        <a:rPr lang="en-ZA" sz="1200" b="0" i="0" u="none" strike="noStrike">
+                          <a:solidFill>
+                            <a:srgbClr val="000000"/>
+                          </a:solidFill>
+                          <a:effectLst/>
+                          <a:latin typeface="Aptos Narrow" panose="020B0004020202020204" pitchFamily="34" charset="0"/>
+                        </a:rPr>
+                        <a:t>7.26%</a:t>
+                      </a:r>
+                    </a:p>
+                  </a:txBody>
+                  <a:tcPr marL="9525" marR="9525" marT="9525" marB="0" anchor="ctr"/>
+                </a:tc>
+                <a:extLst>
+                  <a:ext uri="{0D108BD9-81ED-4DB2-BD59-A6C34878D82A}">
+                    <a16:rowId xmlns:a16="http://schemas.microsoft.com/office/drawing/2014/main" val="1141900463"/>
+                  </a:ext>
+                </a:extLst>
+              </a:tr>
+              <a:tr h="188109">
+                <a:tc>
+                  <a:txBody>
+                    <a:bodyPr/>
+                    <a:lstStyle/>
+                    <a:p>
+                      <a:pPr algn="ctr" fontAlgn="b"/>
+                      <a:r>
+                        <a:rPr lang="en-ZA" sz="1200" u="none" strike="noStrike">
+                          <a:effectLst/>
+                        </a:rPr>
+                        <a:t>3</a:t>
+                      </a:r>
+                      <a:endParaRPr lang="en-ZA" sz="1200" b="0" i="0" u="none" strike="noStrike">
+                        <a:solidFill>
+                          <a:srgbClr val="000000"/>
+                        </a:solidFill>
+                        <a:effectLst/>
+                        <a:latin typeface="Aptos Narrow" panose="020B0004020202020204" pitchFamily="34" charset="0"/>
+                      </a:endParaRPr>
+                    </a:p>
+                  </a:txBody>
+                  <a:tcPr marL="9525" marR="9525" marT="9525" marB="0"/>
+                </a:tc>
+                <a:tc>
+                  <a:txBody>
+                    <a:bodyPr/>
+                    <a:lstStyle/>
+                    <a:p>
+                      <a:pPr algn="ctr" fontAlgn="b"/>
+                      <a:r>
+                        <a:rPr lang="en-ZA" sz="1200" b="0" i="0" u="none" strike="noStrike">
+                          <a:solidFill>
+                            <a:srgbClr val="000000"/>
+                          </a:solidFill>
+                          <a:effectLst/>
+                          <a:latin typeface="Aptos Narrow" panose="020B0004020202020204" pitchFamily="34" charset="0"/>
+                        </a:rPr>
+                        <a:t>71.77%</a:t>
+                      </a:r>
+                    </a:p>
+                  </a:txBody>
+                  <a:tcPr marL="9525" marR="9525" marT="9525" marB="0" anchor="ctr"/>
+                </a:tc>
+                <a:tc>
+                  <a:txBody>
+                    <a:bodyPr/>
+                    <a:lstStyle/>
+                    <a:p>
+                      <a:pPr algn="ctr" fontAlgn="b"/>
+                      <a:r>
+                        <a:rPr lang="en-ZA" sz="1200" b="0" i="0" u="none" strike="noStrike">
+                          <a:solidFill>
+                            <a:srgbClr val="000000"/>
+                          </a:solidFill>
+                          <a:effectLst/>
+                          <a:latin typeface="Aptos Narrow" panose="020B0004020202020204" pitchFamily="34" charset="0"/>
+                        </a:rPr>
+                        <a:t>14.68%</a:t>
+                      </a:r>
+                    </a:p>
+                  </a:txBody>
+                  <a:tcPr marL="9525" marR="9525" marT="9525" marB="0" anchor="ctr"/>
+                </a:tc>
+                <a:extLst>
+                  <a:ext uri="{0D108BD9-81ED-4DB2-BD59-A6C34878D82A}">
+                    <a16:rowId xmlns:a16="http://schemas.microsoft.com/office/drawing/2014/main" val="2835088766"/>
+                  </a:ext>
+                </a:extLst>
+              </a:tr>
+              <a:tr h="188109">
+                <a:tc>
+                  <a:txBody>
+                    <a:bodyPr/>
+                    <a:lstStyle/>
+                    <a:p>
+                      <a:pPr algn="ctr" fontAlgn="b"/>
+                      <a:r>
+                        <a:rPr lang="en-ZA" sz="1200" u="none" strike="noStrike">
+                          <a:effectLst/>
+                        </a:rPr>
+                        <a:t>4</a:t>
+                      </a:r>
+                      <a:endParaRPr lang="en-ZA" sz="1200" b="0" i="0" u="none" strike="noStrike">
+                        <a:solidFill>
+                          <a:srgbClr val="000000"/>
+                        </a:solidFill>
+                        <a:effectLst/>
+                        <a:latin typeface="Aptos Narrow" panose="020B0004020202020204" pitchFamily="34" charset="0"/>
+                      </a:endParaRPr>
+                    </a:p>
+                  </a:txBody>
+                  <a:tcPr marL="9525" marR="9525" marT="9525" marB="0"/>
+                </a:tc>
+                <a:tc>
+                  <a:txBody>
+                    <a:bodyPr/>
+                    <a:lstStyle/>
+                    <a:p>
+                      <a:pPr algn="ctr" fontAlgn="b"/>
+                      <a:r>
+                        <a:rPr lang="en-ZA" sz="1200" b="0" i="0" u="none" strike="noStrike">
+                          <a:solidFill>
+                            <a:srgbClr val="000000"/>
+                          </a:solidFill>
+                          <a:effectLst/>
+                          <a:latin typeface="Aptos Narrow" panose="020B0004020202020204" pitchFamily="34" charset="0"/>
+                        </a:rPr>
+                        <a:t>73.73%</a:t>
+                      </a:r>
+                    </a:p>
+                  </a:txBody>
+                  <a:tcPr marL="9525" marR="9525" marT="9525" marB="0" anchor="ctr"/>
+                </a:tc>
+                <a:tc>
+                  <a:txBody>
+                    <a:bodyPr/>
+                    <a:lstStyle/>
+                    <a:p>
+                      <a:pPr algn="ctr" fontAlgn="b"/>
+                      <a:r>
+                        <a:rPr lang="en-ZA" sz="1200" b="0" i="0" u="none" strike="noStrike">
+                          <a:solidFill>
+                            <a:srgbClr val="000000"/>
+                          </a:solidFill>
+                          <a:effectLst/>
+                          <a:latin typeface="Aptos Narrow" panose="020B0004020202020204" pitchFamily="34" charset="0"/>
+                        </a:rPr>
+                        <a:t>16.64%</a:t>
+                      </a:r>
+                    </a:p>
+                  </a:txBody>
+                  <a:tcPr marL="9525" marR="9525" marT="9525" marB="0" anchor="ctr"/>
+                </a:tc>
+                <a:extLst>
+                  <a:ext uri="{0D108BD9-81ED-4DB2-BD59-A6C34878D82A}">
+                    <a16:rowId xmlns:a16="http://schemas.microsoft.com/office/drawing/2014/main" val="3895295059"/>
+                  </a:ext>
+                </a:extLst>
+              </a:tr>
+              <a:tr h="188109">
+                <a:tc>
+                  <a:txBody>
+                    <a:bodyPr/>
+                    <a:lstStyle/>
+                    <a:p>
+                      <a:pPr algn="ctr" fontAlgn="b"/>
+                      <a:r>
+                        <a:rPr lang="en-ZA" sz="1200" u="none" strike="noStrike">
+                          <a:effectLst/>
+                        </a:rPr>
+                        <a:t>5</a:t>
+                      </a:r>
+                      <a:endParaRPr lang="en-ZA" sz="1200" b="0" i="0" u="none" strike="noStrike">
+                        <a:solidFill>
+                          <a:srgbClr val="000000"/>
+                        </a:solidFill>
+                        <a:effectLst/>
+                        <a:latin typeface="Aptos Narrow" panose="020B0004020202020204" pitchFamily="34" charset="0"/>
+                      </a:endParaRPr>
+                    </a:p>
+                  </a:txBody>
+                  <a:tcPr marL="9525" marR="9525" marT="9525" marB="0"/>
+                </a:tc>
+                <a:tc>
+                  <a:txBody>
+                    <a:bodyPr/>
+                    <a:lstStyle/>
+                    <a:p>
+                      <a:pPr algn="ctr" fontAlgn="b"/>
+                      <a:r>
+                        <a:rPr lang="en-ZA" sz="1200" b="0" i="0" u="none" strike="noStrike">
+                          <a:solidFill>
+                            <a:srgbClr val="000000"/>
+                          </a:solidFill>
+                          <a:effectLst/>
+                          <a:latin typeface="Aptos Narrow" panose="020B0004020202020204" pitchFamily="34" charset="0"/>
+                        </a:rPr>
+                        <a:t>74.84%</a:t>
+                      </a:r>
+                    </a:p>
+                  </a:txBody>
+                  <a:tcPr marL="9525" marR="9525" marT="9525" marB="0" anchor="ctr"/>
+                </a:tc>
+                <a:tc>
+                  <a:txBody>
+                    <a:bodyPr/>
+                    <a:lstStyle/>
+                    <a:p>
+                      <a:pPr algn="ctr" fontAlgn="b"/>
+                      <a:r>
+                        <a:rPr lang="en-ZA" sz="1200" b="0" i="0" u="none" strike="noStrike">
+                          <a:solidFill>
+                            <a:srgbClr val="000000"/>
+                          </a:solidFill>
+                          <a:effectLst/>
+                          <a:latin typeface="Aptos Narrow" panose="020B0004020202020204" pitchFamily="34" charset="0"/>
+                        </a:rPr>
+                        <a:t>17.75%</a:t>
+                      </a:r>
+                    </a:p>
+                  </a:txBody>
+                  <a:tcPr marL="9525" marR="9525" marT="9525" marB="0" anchor="ctr"/>
+                </a:tc>
+                <a:extLst>
+                  <a:ext uri="{0D108BD9-81ED-4DB2-BD59-A6C34878D82A}">
+                    <a16:rowId xmlns:a16="http://schemas.microsoft.com/office/drawing/2014/main" val="4023323088"/>
+                  </a:ext>
+                </a:extLst>
+              </a:tr>
+              <a:tr h="188109">
+                <a:tc>
+                  <a:txBody>
+                    <a:bodyPr/>
+                    <a:lstStyle/>
+                    <a:p>
+                      <a:pPr algn="ctr" fontAlgn="b"/>
+                      <a:r>
+                        <a:rPr lang="en-ZA" sz="1200" u="none" strike="noStrike">
+                          <a:effectLst/>
+                        </a:rPr>
+                        <a:t>6</a:t>
+                      </a:r>
+                      <a:endParaRPr lang="en-ZA" sz="1200" b="0" i="0" u="none" strike="noStrike">
+                        <a:solidFill>
+                          <a:srgbClr val="000000"/>
+                        </a:solidFill>
+                        <a:effectLst/>
+                        <a:latin typeface="Aptos Narrow" panose="020B0004020202020204" pitchFamily="34" charset="0"/>
+                      </a:endParaRPr>
+                    </a:p>
+                  </a:txBody>
+                  <a:tcPr marL="9525" marR="9525" marT="9525" marB="0"/>
+                </a:tc>
+                <a:tc>
+                  <a:txBody>
+                    <a:bodyPr/>
+                    <a:lstStyle/>
+                    <a:p>
+                      <a:pPr algn="ctr" fontAlgn="b"/>
+                      <a:r>
+                        <a:rPr lang="en-ZA" sz="1200" b="0" i="0" u="none" strike="noStrike">
+                          <a:solidFill>
+                            <a:srgbClr val="000000"/>
+                          </a:solidFill>
+                          <a:effectLst/>
+                          <a:latin typeface="Aptos Narrow" panose="020B0004020202020204" pitchFamily="34" charset="0"/>
+                        </a:rPr>
+                        <a:t>83.49%</a:t>
+                      </a:r>
+                    </a:p>
+                  </a:txBody>
+                  <a:tcPr marL="9525" marR="9525" marT="9525" marB="0" anchor="ctr"/>
+                </a:tc>
+                <a:tc>
+                  <a:txBody>
+                    <a:bodyPr/>
+                    <a:lstStyle/>
+                    <a:p>
+                      <a:pPr algn="ctr" fontAlgn="b"/>
+                      <a:r>
+                        <a:rPr lang="en-ZA" sz="1200" b="0" i="0" u="none" strike="noStrike" dirty="0">
+                          <a:solidFill>
+                            <a:srgbClr val="000000"/>
+                          </a:solidFill>
+                          <a:effectLst/>
+                          <a:latin typeface="Aptos Narrow" panose="020B0004020202020204" pitchFamily="34" charset="0"/>
+                        </a:rPr>
+                        <a:t>26.40%</a:t>
+                      </a:r>
+                    </a:p>
+                  </a:txBody>
+                  <a:tcPr marL="9525" marR="9525" marT="9525" marB="0" anchor="ctr"/>
+                </a:tc>
+                <a:extLst>
+                  <a:ext uri="{0D108BD9-81ED-4DB2-BD59-A6C34878D82A}">
+                    <a16:rowId xmlns:a16="http://schemas.microsoft.com/office/drawing/2014/main" val="1334966385"/>
+                  </a:ext>
+                </a:extLst>
+              </a:tr>
+            </a:tbl>
+          </a:graphicData>
+        </a:graphic>
+      </p:graphicFrame>
+      <p:pic>
+        <p:nvPicPr>
+          <p:cNvPr id="8" name="Picture 7">
+            <a:extLst>
+              <a:ext uri="{FF2B5EF4-FFF2-40B4-BE49-F238E27FC236}">
+                <a16:creationId xmlns:a16="http://schemas.microsoft.com/office/drawing/2014/main" id="{02B07D94-6C14-614F-6914-8DA11E46AC69}"/>
+              </a:ext>
+            </a:extLst>
+          </p:cNvPr>
+          <p:cNvPicPr>
+            <a:picLocks noChangeAspect="1"/>
+          </p:cNvPicPr>
+          <p:nvPr/>
+        </p:nvPicPr>
+        <p:blipFill>
+          <a:blip r:embed="rId2"/>
+          <a:stretch>
+            <a:fillRect/>
+          </a:stretch>
+        </p:blipFill>
+        <p:spPr>
+          <a:xfrm>
+            <a:off x="326208" y="2085067"/>
+            <a:ext cx="7772400" cy="3994149"/>
+          </a:xfrm>
+          <a:prstGeom prst="rect">
+            <a:avLst/>
+          </a:prstGeom>
+        </p:spPr>
+      </p:pic>
+      <p:sp>
+        <p:nvSpPr>
+          <p:cNvPr id="10" name="TextBox 9">
+            <a:extLst>
+              <a:ext uri="{FF2B5EF4-FFF2-40B4-BE49-F238E27FC236}">
+                <a16:creationId xmlns:a16="http://schemas.microsoft.com/office/drawing/2014/main" id="{2DF2C12F-E096-4F0F-7A60-29160AAF23FB}"/>
+              </a:ext>
+            </a:extLst>
+          </p:cNvPr>
+          <p:cNvSpPr txBox="1"/>
+          <p:nvPr/>
+        </p:nvSpPr>
+        <p:spPr>
+          <a:xfrm>
+            <a:off x="8843191" y="1913373"/>
+            <a:ext cx="3098074" cy="646331"/>
+          </a:xfrm>
+          <a:prstGeom prst="rect">
+            <a:avLst/>
+          </a:prstGeom>
+          <a:noFill/>
+        </p:spPr>
+        <p:txBody>
+          <a:bodyPr wrap="square" rtlCol="0">
+            <a:spAutoFit/>
+          </a:bodyPr>
           <a:lstStyle/>
           <a:p>
-            <a:endParaRPr lang="en-GB"/>
+            <a:r>
+              <a:rPr lang="en-GB" dirty="0">
+                <a:solidFill>
+                  <a:schemeClr val="accent5"/>
+                </a:solidFill>
+              </a:rPr>
+              <a:t>Used as inputs to dynamic experiments</a:t>
+            </a:r>
           </a:p>
         </p:txBody>
       </p:sp>
@@ -8208,6 +8969,133 @@
           <p:cNvPr id="2" name="Title 1">
             <a:extLst>
               <a:ext uri="{FF2B5EF4-FFF2-40B4-BE49-F238E27FC236}">
+                <a16:creationId xmlns:a16="http://schemas.microsoft.com/office/drawing/2014/main" id="{9708B348-0A92-6415-8046-D49D934F66AD}"/>
+              </a:ext>
+            </a:extLst>
+          </p:cNvPr>
+          <p:cNvSpPr>
+            <a:spLocks noGrp="1"/>
+          </p:cNvSpPr>
+          <p:nvPr>
+            <p:ph type="title"/>
+          </p:nvPr>
+        </p:nvSpPr>
+        <p:spPr/>
+        <p:txBody>
+          <a:bodyPr/>
+          <a:lstStyle/>
+          <a:p>
+            <a:r>
+              <a:rPr lang="en-GB" dirty="0"/>
+              <a:t>Cascade Rates</a:t>
+            </a:r>
+          </a:p>
+        </p:txBody>
+      </p:sp>
+      <p:graphicFrame>
+        <p:nvGraphicFramePr>
+          <p:cNvPr id="8" name="Object 7">
+            <a:extLst>
+              <a:ext uri="{FF2B5EF4-FFF2-40B4-BE49-F238E27FC236}">
+                <a16:creationId xmlns:a16="http://schemas.microsoft.com/office/drawing/2014/main" id="{734FB879-1021-FF7C-E605-30A22F0EC38F}"/>
+              </a:ext>
+            </a:extLst>
+          </p:cNvPr>
+          <p:cNvGraphicFramePr>
+            <a:graphicFrameLocks noChangeAspect="1"/>
+          </p:cNvGraphicFramePr>
+          <p:nvPr>
+            <p:extLst>
+              <p:ext uri="{D42A27DB-BD31-4B8C-83A1-F6EECF244321}">
+                <p14:modId xmlns:p14="http://schemas.microsoft.com/office/powerpoint/2010/main" val="3604105498"/>
+              </p:ext>
+            </p:extLst>
+          </p:nvPr>
+        </p:nvGraphicFramePr>
+        <p:xfrm>
+          <a:off x="337959" y="2239963"/>
+          <a:ext cx="11737374" cy="3050494"/>
+        </p:xfrm>
+        <a:graphic>
+          <a:graphicData uri="http://schemas.openxmlformats.org/presentationml/2006/ole">
+            <mc:AlternateContent xmlns:mc="http://schemas.openxmlformats.org/markup-compatibility/2006">
+              <mc:Choice xmlns:v="urn:schemas-microsoft-com:vml" Requires="v">
+                <p:oleObj name="Worksheet" r:id="rId2" imgW="13487400" imgH="3505200" progId="Excel.Sheet.12">
+                  <p:embed/>
+                </p:oleObj>
+              </mc:Choice>
+              <mc:Fallback>
+                <p:oleObj name="Worksheet" r:id="rId2" imgW="13487400" imgH="3505200" progId="Excel.Sheet.12">
+                  <p:embed/>
+                  <p:pic>
+                    <p:nvPicPr>
+                      <p:cNvPr id="8" name="Object 7">
+                        <a:extLst>
+                          <a:ext uri="{FF2B5EF4-FFF2-40B4-BE49-F238E27FC236}">
+                            <a16:creationId xmlns:a16="http://schemas.microsoft.com/office/drawing/2014/main" id="{734FB879-1021-FF7C-E605-30A22F0EC38F}"/>
+                          </a:ext>
+                        </a:extLst>
+                      </p:cNvPr>
+                      <p:cNvPicPr/>
+                      <p:nvPr/>
+                    </p:nvPicPr>
+                    <p:blipFill>
+                      <a:blip r:embed="rId3"/>
+                      <a:stretch>
+                        <a:fillRect/>
+                      </a:stretch>
+                    </p:blipFill>
+                    <p:spPr>
+                      <a:xfrm>
+                        <a:off x="337959" y="2239963"/>
+                        <a:ext cx="11737374" cy="3050494"/>
+                      </a:xfrm>
+                      <a:prstGeom prst="rect">
+                        <a:avLst/>
+                      </a:prstGeom>
+                    </p:spPr>
+                  </p:pic>
+                </p:oleObj>
+              </mc:Fallback>
+            </mc:AlternateContent>
+          </a:graphicData>
+        </a:graphic>
+      </p:graphicFrame>
+    </p:spTree>
+    <p:extLst>
+      <p:ext uri="{BB962C8B-B14F-4D97-AF65-F5344CB8AC3E}">
+        <p14:creationId xmlns:p14="http://schemas.microsoft.com/office/powerpoint/2010/main" val="2272290611"/>
+      </p:ext>
+    </p:extLst>
+  </p:cSld>
+  <p:clrMapOvr>
+    <a:masterClrMapping/>
+  </p:clrMapOvr>
+</p:sld>
+</file>
+
+<file path=ppt/slides/slide6.xml><?xml version="1.0" encoding="utf-8"?>
+<p:sld xmlns:a="http://schemas.openxmlformats.org/drawingml/2006/main" xmlns:r="http://schemas.openxmlformats.org/officeDocument/2006/relationships" xmlns:p="http://schemas.openxmlformats.org/presentationml/2006/main">
+  <p:cSld>
+    <p:spTree>
+      <p:nvGrpSpPr>
+        <p:cNvPr id="1" name=""/>
+        <p:cNvGrpSpPr/>
+        <p:nvPr/>
+      </p:nvGrpSpPr>
+      <p:grpSpPr>
+        <a:xfrm>
+          <a:off x="0" y="0"/>
+          <a:ext cx="0" cy="0"/>
+          <a:chOff x="0" y="0"/>
+          <a:chExt cx="0" cy="0"/>
+        </a:xfrm>
+      </p:grpSpPr>
+      <p:sp>
+        <p:nvSpPr>
+          <p:cNvPr id="2" name="Title 1">
+            <a:extLst>
+              <a:ext uri="{FF2B5EF4-FFF2-40B4-BE49-F238E27FC236}">
                 <a16:creationId xmlns:a16="http://schemas.microsoft.com/office/drawing/2014/main" id="{460246A5-8FE9-F63F-C88F-A6129A77A110}"/>
               </a:ext>
             </a:extLst>
@@ -8269,7 +9157,7 @@
 </p:sld>
 </file>
 
-<file path=ppt/slides/slide6.xml><?xml version="1.0" encoding="utf-8"?>
+<file path=ppt/slides/slide7.xml><?xml version="1.0" encoding="utf-8"?>
 <p:sld xmlns:a="http://schemas.openxmlformats.org/drawingml/2006/main" xmlns:r="http://schemas.openxmlformats.org/officeDocument/2006/relationships" xmlns:p="http://schemas.openxmlformats.org/presentationml/2006/main">
   <p:cSld>
     <p:spTree>
@@ -8357,7 +9245,7 @@
 </p:sld>
 </file>
 
-<file path=ppt/slides/slide7.xml><?xml version="1.0" encoding="utf-8"?>
+<file path=ppt/slides/slide8.xml><?xml version="1.0" encoding="utf-8"?>
 <p:sld xmlns:a="http://schemas.openxmlformats.org/drawingml/2006/main" xmlns:r="http://schemas.openxmlformats.org/officeDocument/2006/relationships" xmlns:p="http://schemas.openxmlformats.org/presentationml/2006/main">
   <p:cSld>
     <p:spTree>
@@ -8479,7 +9367,7 @@
 </p:sld>
 </file>
 
-<file path=ppt/slides/slide8.xml><?xml version="1.0" encoding="utf-8"?>
+<file path=ppt/slides/slide9.xml><?xml version="1.0" encoding="utf-8"?>
 <p:sld xmlns:a="http://schemas.openxmlformats.org/drawingml/2006/main" xmlns:r="http://schemas.openxmlformats.org/officeDocument/2006/relationships" xmlns:p="http://schemas.openxmlformats.org/presentationml/2006/main">
   <p:cSld>
     <p:spTree>
@@ -8558,99 +9446,6 @@
     <p:extLst>
       <p:ext uri="{BB962C8B-B14F-4D97-AF65-F5344CB8AC3E}">
         <p14:creationId xmlns:p14="http://schemas.microsoft.com/office/powerpoint/2010/main" val="4213112200"/>
-      </p:ext>
-    </p:extLst>
-  </p:cSld>
-  <p:clrMapOvr>
-    <a:masterClrMapping/>
-  </p:clrMapOvr>
-</p:sld>
-</file>
-
-<file path=ppt/slides/slide9.xml><?xml version="1.0" encoding="utf-8"?>
-<p:sld xmlns:a="http://schemas.openxmlformats.org/drawingml/2006/main" xmlns:r="http://schemas.openxmlformats.org/officeDocument/2006/relationships" xmlns:p="http://schemas.openxmlformats.org/presentationml/2006/main">
-  <p:cSld>
-    <p:spTree>
-      <p:nvGrpSpPr>
-        <p:cNvPr id="1" name=""/>
-        <p:cNvGrpSpPr/>
-        <p:nvPr/>
-      </p:nvGrpSpPr>
-      <p:grpSpPr>
-        <a:xfrm>
-          <a:off x="0" y="0"/>
-          <a:ext cx="0" cy="0"/>
-          <a:chOff x="0" y="0"/>
-          <a:chExt cx="0" cy="0"/>
-        </a:xfrm>
-      </p:grpSpPr>
-      <p:sp>
-        <p:nvSpPr>
-          <p:cNvPr id="2" name="Title 1">
-            <a:extLst>
-              <a:ext uri="{FF2B5EF4-FFF2-40B4-BE49-F238E27FC236}">
-                <a16:creationId xmlns:a16="http://schemas.microsoft.com/office/drawing/2014/main" id="{0D3F3A6F-B77F-5F36-593F-AC0FCC1F4217}"/>
-              </a:ext>
-            </a:extLst>
-          </p:cNvPr>
-          <p:cNvSpPr>
-            <a:spLocks noGrp="1"/>
-          </p:cNvSpPr>
-          <p:nvPr>
-            <p:ph type="title"/>
-          </p:nvPr>
-        </p:nvSpPr>
-        <p:spPr>
-          <a:xfrm>
-            <a:off x="167519" y="204574"/>
-            <a:ext cx="7892748" cy="1325563"/>
-          </a:xfrm>
-        </p:spPr>
-        <p:txBody>
-          <a:bodyPr/>
-          <a:lstStyle/>
-          <a:p>
-            <a:r>
-              <a:rPr lang="en-GB" dirty="0"/>
-              <a:t>Tornado Plots: Progression</a:t>
-            </a:r>
-          </a:p>
-        </p:txBody>
-      </p:sp>
-      <p:pic>
-        <p:nvPicPr>
-          <p:cNvPr id="5" name="Picture 4">
-            <a:extLst>
-              <a:ext uri="{FF2B5EF4-FFF2-40B4-BE49-F238E27FC236}">
-                <a16:creationId xmlns:a16="http://schemas.microsoft.com/office/drawing/2014/main" id="{3C7AAEEF-68D0-F824-D25D-86B26417EFD8}"/>
-              </a:ext>
-            </a:extLst>
-          </p:cNvPr>
-          <p:cNvPicPr>
-            <a:picLocks noChangeAspect="1"/>
-          </p:cNvPicPr>
-          <p:nvPr/>
-        </p:nvPicPr>
-        <p:blipFill>
-          <a:blip r:embed="rId2"/>
-          <a:stretch>
-            <a:fillRect/>
-          </a:stretch>
-        </p:blipFill>
-        <p:spPr>
-          <a:xfrm>
-            <a:off x="287867" y="1246231"/>
-            <a:ext cx="9096796" cy="5109413"/>
-          </a:xfrm>
-          <a:prstGeom prst="rect">
-            <a:avLst/>
-          </a:prstGeom>
-        </p:spPr>
-      </p:pic>
-    </p:spTree>
-    <p:extLst>
-      <p:ext uri="{BB962C8B-B14F-4D97-AF65-F5344CB8AC3E}">
-        <p14:creationId xmlns:p14="http://schemas.microsoft.com/office/powerpoint/2010/main" val="455533378"/>
       </p:ext>
     </p:extLst>
   </p:cSld>

</xml_diff>